<commit_message>
add fix bulk fraction
</commit_message>
<xml_diff>
--- a/examples/notebook/slides/Pt20Au80_AgBP1.pptx
+++ b/examples/notebook/slides/Pt20Au80_AgBP1.pptx
@@ -3166,7 +3166,7 @@
                 </a:solidFill>
                 <a:latin typeface="Meiryo"/>
               </a:rPr>
-              <a:t>2023-05-21</a:t>
+              <a:t>2023-07-12</a:t>
             </a:r>
           </a:p>
         </p:txBody>
@@ -7862,7 +7862,7 @@
                 <a:gridCol w="1219200"/>
                 <a:gridCol w="1219200"/>
               </a:tblGrid>
-              <a:tr h="287382">
+              <a:tr h="194678">
                 <a:tc>
                   <a:txBody>
                     <a:bodyPr/>
@@ -8069,7 +8069,1177 @@
                   </a:tcPr>
                 </a:tc>
               </a:tr>
-              <a:tr h="287382">
+              <a:tr h="194678">
+                <a:tc>
+                  <a:txBody>
+                    <a:bodyPr/>
+                    <a:lstStyle/>
+                    <a:p>
+                      <a:pPr algn="ctr"/>
+                      <a:r>
+                        <a:rPr sz="1200" b="0" i="0" u="none">
+                          <a:solidFill>
+                            <a:srgbClr val="404040"/>
+                          </a:solidFill>
+                          <a:latin typeface="Meiryo"/>
+                        </a:rPr>
+                        <a:t>dP</a:t>
+                      </a:r>
+                    </a:p>
+                  </a:txBody>
+                  <a:tcPr anchor="ctr">
+                    <a:solidFill>
+                      <a:srgbClr val="FFFFFF"/>
+                    </a:solidFill>
+                  </a:tcPr>
+                </a:tc>
+                <a:tc>
+                  <a:txBody>
+                    <a:bodyPr/>
+                    <a:lstStyle/>
+                    <a:p>
+                      <a:pPr algn="ctr"/>
+                      <a:r>
+                        <a:rPr sz="1200" b="0" i="0" u="none">
+                          <a:solidFill>
+                            <a:srgbClr val="404040"/>
+                          </a:solidFill>
+                          <a:latin typeface="Meiryo"/>
+                        </a:rPr>
+                        <a:t>2.8</a:t>
+                      </a:r>
+                    </a:p>
+                  </a:txBody>
+                  <a:tcPr anchor="ctr">
+                    <a:solidFill>
+                      <a:srgbClr val="FFFFFF"/>
+                    </a:solidFill>
+                  </a:tcPr>
+                </a:tc>
+                <a:tc>
+                  <a:txBody>
+                    <a:bodyPr/>
+                    <a:lstStyle/>
+                    <a:p>
+                      <a:pPr algn="ctr"/>
+                      <a:r>
+                        <a:rPr sz="1200" b="0" i="0" u="none">
+                          <a:solidFill>
+                            <a:srgbClr val="404040"/>
+                          </a:solidFill>
+                          <a:latin typeface="Meiryo"/>
+                        </a:rPr>
+                        <a:t>2.8</a:t>
+                      </a:r>
+                    </a:p>
+                  </a:txBody>
+                  <a:tcPr anchor="ctr">
+                    <a:solidFill>
+                      <a:srgbClr val="FFFFFF"/>
+                    </a:solidFill>
+                  </a:tcPr>
+                </a:tc>
+                <a:tc>
+                  <a:txBody>
+                    <a:bodyPr/>
+                    <a:lstStyle/>
+                    <a:p>
+                      <a:pPr algn="ctr"/>
+                      <a:r>
+                        <a:rPr sz="1200" b="0" i="0" u="none">
+                          <a:solidFill>
+                            <a:srgbClr val="404040"/>
+                          </a:solidFill>
+                          <a:latin typeface="Meiryo"/>
+                        </a:rPr>
+                        <a:t>2.8</a:t>
+                      </a:r>
+                    </a:p>
+                  </a:txBody>
+                  <a:tcPr anchor="ctr">
+                    <a:solidFill>
+                      <a:srgbClr val="FFFFFF"/>
+                    </a:solidFill>
+                  </a:tcPr>
+                </a:tc>
+                <a:tc>
+                  <a:txBody>
+                    <a:bodyPr/>
+                    <a:lstStyle/>
+                    <a:p>
+                      <a:pPr algn="ctr"/>
+                      <a:r>
+                        <a:rPr sz="1200" b="0" i="0" u="none">
+                          <a:solidFill>
+                            <a:srgbClr val="404040"/>
+                          </a:solidFill>
+                          <a:latin typeface="Meiryo"/>
+                        </a:rPr>
+                        <a:t>0.0</a:t>
+                      </a:r>
+                    </a:p>
+                  </a:txBody>
+                  <a:tcPr anchor="ctr">
+                    <a:solidFill>
+                      <a:srgbClr val="FFFFFF"/>
+                    </a:solidFill>
+                  </a:tcPr>
+                </a:tc>
+              </a:tr>
+              <a:tr h="194678">
+                <a:tc>
+                  <a:txBody>
+                    <a:bodyPr/>
+                    <a:lstStyle/>
+                    <a:p>
+                      <a:pPr algn="ctr"/>
+                      <a:r>
+                        <a:rPr sz="1200" b="0" i="0" u="none">
+                          <a:solidFill>
+                            <a:srgbClr val="404040"/>
+                          </a:solidFill>
+                          <a:latin typeface="Meiryo"/>
+                        </a:rPr>
+                        <a:t>dA</a:t>
+                      </a:r>
+                    </a:p>
+                  </a:txBody>
+                  <a:tcPr anchor="ctr">
+                    <a:solidFill>
+                      <a:srgbClr val="FFFFFF"/>
+                    </a:solidFill>
+                  </a:tcPr>
+                </a:tc>
+                <a:tc>
+                  <a:txBody>
+                    <a:bodyPr/>
+                    <a:lstStyle/>
+                    <a:p>
+                      <a:pPr algn="ctr"/>
+                      <a:r>
+                        <a:rPr sz="1200" b="0" i="0" u="none">
+                          <a:solidFill>
+                            <a:srgbClr val="404040"/>
+                          </a:solidFill>
+                          <a:latin typeface="Meiryo"/>
+                        </a:rPr>
+                        <a:t>2.9</a:t>
+                      </a:r>
+                    </a:p>
+                  </a:txBody>
+                  <a:tcPr anchor="ctr">
+                    <a:solidFill>
+                      <a:srgbClr val="FFFFFF"/>
+                    </a:solidFill>
+                  </a:tcPr>
+                </a:tc>
+                <a:tc>
+                  <a:txBody>
+                    <a:bodyPr/>
+                    <a:lstStyle/>
+                    <a:p>
+                      <a:pPr algn="ctr"/>
+                      <a:r>
+                        <a:rPr sz="1200" b="0" i="0" u="none">
+                          <a:solidFill>
+                            <a:srgbClr val="404040"/>
+                          </a:solidFill>
+                          <a:latin typeface="Meiryo"/>
+                        </a:rPr>
+                        <a:t>2.9</a:t>
+                      </a:r>
+                    </a:p>
+                  </a:txBody>
+                  <a:tcPr anchor="ctr">
+                    <a:solidFill>
+                      <a:srgbClr val="FFFFFF"/>
+                    </a:solidFill>
+                  </a:tcPr>
+                </a:tc>
+                <a:tc>
+                  <a:txBody>
+                    <a:bodyPr/>
+                    <a:lstStyle/>
+                    <a:p>
+                      <a:pPr algn="ctr"/>
+                      <a:r>
+                        <a:rPr sz="1200" b="0" i="0" u="none">
+                          <a:solidFill>
+                            <a:srgbClr val="404040"/>
+                          </a:solidFill>
+                          <a:latin typeface="Meiryo"/>
+                        </a:rPr>
+                        <a:t>2.9</a:t>
+                      </a:r>
+                    </a:p>
+                  </a:txBody>
+                  <a:tcPr anchor="ctr">
+                    <a:solidFill>
+                      <a:srgbClr val="FFFFFF"/>
+                    </a:solidFill>
+                  </a:tcPr>
+                </a:tc>
+                <a:tc>
+                  <a:txBody>
+                    <a:bodyPr/>
+                    <a:lstStyle/>
+                    <a:p>
+                      <a:pPr algn="ctr"/>
+                      <a:r>
+                        <a:rPr sz="1200" b="0" i="0" u="none">
+                          <a:solidFill>
+                            <a:srgbClr val="404040"/>
+                          </a:solidFill>
+                          <a:latin typeface="Meiryo"/>
+                        </a:rPr>
+                        <a:t>0.0</a:t>
+                      </a:r>
+                    </a:p>
+                  </a:txBody>
+                  <a:tcPr anchor="ctr">
+                    <a:solidFill>
+                      <a:srgbClr val="FFFFFF"/>
+                    </a:solidFill>
+                  </a:tcPr>
+                </a:tc>
+              </a:tr>
+              <a:tr h="194678">
+                <a:tc>
+                  <a:txBody>
+                    <a:bodyPr/>
+                    <a:lstStyle/>
+                    <a:p>
+                      <a:pPr algn="ctr"/>
+                      <a:r>
+                        <a:rPr sz="1200" b="0" i="0" u="none">
+                          <a:solidFill>
+                            <a:srgbClr val="404040"/>
+                          </a:solidFill>
+                          <a:latin typeface="Meiryo"/>
+                        </a:rPr>
+                        <a:t>fA</a:t>
+                      </a:r>
+                    </a:p>
+                  </a:txBody>
+                  <a:tcPr anchor="ctr">
+                    <a:solidFill>
+                      <a:srgbClr val="FFFFFF"/>
+                    </a:solidFill>
+                  </a:tcPr>
+                </a:tc>
+                <a:tc>
+                  <a:txBody>
+                    <a:bodyPr/>
+                    <a:lstStyle/>
+                    <a:p>
+                      <a:pPr algn="ctr"/>
+                      <a:r>
+                        <a:rPr sz="1200" b="0" i="0" u="none">
+                          <a:solidFill>
+                            <a:srgbClr val="404040"/>
+                          </a:solidFill>
+                          <a:latin typeface="Meiryo"/>
+                        </a:rPr>
+                        <a:t>0.8</a:t>
+                      </a:r>
+                    </a:p>
+                  </a:txBody>
+                  <a:tcPr anchor="ctr">
+                    <a:solidFill>
+                      <a:srgbClr val="FFFFFF"/>
+                    </a:solidFill>
+                  </a:tcPr>
+                </a:tc>
+                <a:tc>
+                  <a:txBody>
+                    <a:bodyPr/>
+                    <a:lstStyle/>
+                    <a:p>
+                      <a:pPr algn="ctr"/>
+                      <a:r>
+                        <a:rPr sz="1200" b="0" i="0" u="none">
+                          <a:solidFill>
+                            <a:srgbClr val="404040"/>
+                          </a:solidFill>
+                          <a:latin typeface="Meiryo"/>
+                        </a:rPr>
+                        <a:t>0.8</a:t>
+                      </a:r>
+                    </a:p>
+                  </a:txBody>
+                  <a:tcPr anchor="ctr">
+                    <a:solidFill>
+                      <a:srgbClr val="FFFFFF"/>
+                    </a:solidFill>
+                  </a:tcPr>
+                </a:tc>
+                <a:tc>
+                  <a:txBody>
+                    <a:bodyPr/>
+                    <a:lstStyle/>
+                    <a:p>
+                      <a:pPr algn="ctr"/>
+                      <a:r>
+                        <a:rPr sz="1200" b="0" i="0" u="none">
+                          <a:solidFill>
+                            <a:srgbClr val="404040"/>
+                          </a:solidFill>
+                          <a:latin typeface="Meiryo"/>
+                        </a:rPr>
+                        <a:t>0.8</a:t>
+                      </a:r>
+                    </a:p>
+                  </a:txBody>
+                  <a:tcPr anchor="ctr">
+                    <a:solidFill>
+                      <a:srgbClr val="FFFFFF"/>
+                    </a:solidFill>
+                  </a:tcPr>
+                </a:tc>
+                <a:tc>
+                  <a:txBody>
+                    <a:bodyPr/>
+                    <a:lstStyle/>
+                    <a:p>
+                      <a:pPr algn="ctr"/>
+                      <a:r>
+                        <a:rPr sz="1200" b="0" i="0" u="none">
+                          <a:solidFill>
+                            <a:srgbClr val="404040"/>
+                          </a:solidFill>
+                          <a:latin typeface="Meiryo"/>
+                        </a:rPr>
+                        <a:t>0.0</a:t>
+                      </a:r>
+                    </a:p>
+                  </a:txBody>
+                  <a:tcPr anchor="ctr">
+                    <a:solidFill>
+                      <a:srgbClr val="FFFFFF"/>
+                    </a:solidFill>
+                  </a:tcPr>
+                </a:tc>
+              </a:tr>
+              <a:tr h="194678">
+                <a:tc>
+                  <a:txBody>
+                    <a:bodyPr/>
+                    <a:lstStyle/>
+                    <a:p>
+                      <a:pPr algn="ctr"/>
+                      <a:r>
+                        <a:rPr sz="1200" b="0" i="0" u="none">
+                          <a:solidFill>
+                            <a:srgbClr val="404040"/>
+                          </a:solidFill>
+                          <a:latin typeface="Meiryo"/>
+                        </a:rPr>
+                        <a:t>nAA</a:t>
+                      </a:r>
+                    </a:p>
+                  </a:txBody>
+                  <a:tcPr anchor="ctr">
+                    <a:solidFill>
+                      <a:srgbClr val="FFFFFF"/>
+                    </a:solidFill>
+                  </a:tcPr>
+                </a:tc>
+                <a:tc>
+                  <a:txBody>
+                    <a:bodyPr/>
+                    <a:lstStyle/>
+                    <a:p>
+                      <a:pPr algn="ctr"/>
+                      <a:r>
+                        <a:rPr sz="1200" b="0" i="0" u="none">
+                          <a:solidFill>
+                            <a:srgbClr val="404040"/>
+                          </a:solidFill>
+                          <a:latin typeface="Meiryo"/>
+                        </a:rPr>
+                        <a:t>6.0</a:t>
+                      </a:r>
+                    </a:p>
+                  </a:txBody>
+                  <a:tcPr anchor="ctr">
+                    <a:solidFill>
+                      <a:srgbClr val="FFFFFF"/>
+                    </a:solidFill>
+                  </a:tcPr>
+                </a:tc>
+                <a:tc>
+                  <a:txBody>
+                    <a:bodyPr/>
+                    <a:lstStyle/>
+                    <a:p>
+                      <a:pPr algn="ctr"/>
+                      <a:r>
+                        <a:rPr sz="1200" b="0" i="0" u="none">
+                          <a:solidFill>
+                            <a:srgbClr val="404040"/>
+                          </a:solidFill>
+                          <a:latin typeface="Meiryo"/>
+                        </a:rPr>
+                        <a:t>7.0</a:t>
+                      </a:r>
+                    </a:p>
+                  </a:txBody>
+                  <a:tcPr anchor="ctr">
+                    <a:solidFill>
+                      <a:srgbClr val="FFFFFF"/>
+                    </a:solidFill>
+                  </a:tcPr>
+                </a:tc>
+                <a:tc>
+                  <a:txBody>
+                    <a:bodyPr/>
+                    <a:lstStyle/>
+                    <a:p>
+                      <a:pPr algn="ctr"/>
+                      <a:r>
+                        <a:rPr sz="1200" b="0" i="0" u="none">
+                          <a:solidFill>
+                            <a:srgbClr val="404040"/>
+                          </a:solidFill>
+                          <a:latin typeface="Meiryo"/>
+                        </a:rPr>
+                        <a:t>6.6</a:t>
+                      </a:r>
+                    </a:p>
+                  </a:txBody>
+                  <a:tcPr anchor="ctr">
+                    <a:solidFill>
+                      <a:srgbClr val="FFFFFF"/>
+                    </a:solidFill>
+                  </a:tcPr>
+                </a:tc>
+                <a:tc>
+                  <a:txBody>
+                    <a:bodyPr/>
+                    <a:lstStyle/>
+                    <a:p>
+                      <a:pPr algn="ctr"/>
+                      <a:r>
+                        <a:rPr sz="1200" b="0" i="0" u="none">
+                          <a:solidFill>
+                            <a:srgbClr val="404040"/>
+                          </a:solidFill>
+                          <a:latin typeface="Meiryo"/>
+                        </a:rPr>
+                        <a:t>0.3</a:t>
+                      </a:r>
+                    </a:p>
+                  </a:txBody>
+                  <a:tcPr anchor="ctr">
+                    <a:solidFill>
+                      <a:srgbClr val="FFFFFF"/>
+                    </a:solidFill>
+                  </a:tcPr>
+                </a:tc>
+              </a:tr>
+              <a:tr h="194678">
+                <a:tc>
+                  <a:txBody>
+                    <a:bodyPr/>
+                    <a:lstStyle/>
+                    <a:p>
+                      <a:pPr algn="ctr"/>
+                      <a:r>
+                        <a:rPr sz="1200" b="0" i="0" u="none">
+                          <a:solidFill>
+                            <a:srgbClr val="404040"/>
+                          </a:solidFill>
+                          <a:latin typeface="Meiryo"/>
+                        </a:rPr>
+                        <a:t>nPP</a:t>
+                      </a:r>
+                    </a:p>
+                  </a:txBody>
+                  <a:tcPr anchor="ctr">
+                    <a:solidFill>
+                      <a:srgbClr val="FFFFFF"/>
+                    </a:solidFill>
+                  </a:tcPr>
+                </a:tc>
+                <a:tc>
+                  <a:txBody>
+                    <a:bodyPr/>
+                    <a:lstStyle/>
+                    <a:p>
+                      <a:pPr algn="ctr"/>
+                      <a:r>
+                        <a:rPr sz="1200" b="0" i="0" u="none">
+                          <a:solidFill>
+                            <a:srgbClr val="404040"/>
+                          </a:solidFill>
+                          <a:latin typeface="Meiryo"/>
+                        </a:rPr>
+                        <a:t>9.2</a:t>
+                      </a:r>
+                    </a:p>
+                  </a:txBody>
+                  <a:tcPr anchor="ctr">
+                    <a:solidFill>
+                      <a:srgbClr val="FFFFFF"/>
+                    </a:solidFill>
+                  </a:tcPr>
+                </a:tc>
+                <a:tc>
+                  <a:txBody>
+                    <a:bodyPr/>
+                    <a:lstStyle/>
+                    <a:p>
+                      <a:pPr algn="ctr"/>
+                      <a:r>
+                        <a:rPr sz="1200" b="0" i="0" u="none">
+                          <a:solidFill>
+                            <a:srgbClr val="404040"/>
+                          </a:solidFill>
+                          <a:latin typeface="Meiryo"/>
+                        </a:rPr>
+                        <a:t>10.6</a:t>
+                      </a:r>
+                    </a:p>
+                  </a:txBody>
+                  <a:tcPr anchor="ctr">
+                    <a:solidFill>
+                      <a:srgbClr val="FFFFFF"/>
+                    </a:solidFill>
+                  </a:tcPr>
+                </a:tc>
+                <a:tc>
+                  <a:txBody>
+                    <a:bodyPr/>
+                    <a:lstStyle/>
+                    <a:p>
+                      <a:pPr algn="ctr"/>
+                      <a:r>
+                        <a:rPr sz="1200" b="0" i="0" u="none">
+                          <a:solidFill>
+                            <a:srgbClr val="404040"/>
+                          </a:solidFill>
+                          <a:latin typeface="Meiryo"/>
+                        </a:rPr>
+                        <a:t>9.8</a:t>
+                      </a:r>
+                    </a:p>
+                  </a:txBody>
+                  <a:tcPr anchor="ctr">
+                    <a:solidFill>
+                      <a:srgbClr val="FFFFFF"/>
+                    </a:solidFill>
+                  </a:tcPr>
+                </a:tc>
+                <a:tc>
+                  <a:txBody>
+                    <a:bodyPr/>
+                    <a:lstStyle/>
+                    <a:p>
+                      <a:pPr algn="ctr"/>
+                      <a:r>
+                        <a:rPr sz="1200" b="0" i="0" u="none">
+                          <a:solidFill>
+                            <a:srgbClr val="404040"/>
+                          </a:solidFill>
+                          <a:latin typeface="Meiryo"/>
+                        </a:rPr>
+                        <a:t>0.4</a:t>
+                      </a:r>
+                    </a:p>
+                  </a:txBody>
+                  <a:tcPr anchor="ctr">
+                    <a:solidFill>
+                      <a:srgbClr val="FFFFFF"/>
+                    </a:solidFill>
+                  </a:tcPr>
+                </a:tc>
+              </a:tr>
+              <a:tr h="194678">
+                <a:tc>
+                  <a:txBody>
+                    <a:bodyPr/>
+                    <a:lstStyle/>
+                    <a:p>
+                      <a:pPr algn="ctr"/>
+                      <a:r>
+                        <a:rPr sz="1200" b="0" i="0" u="none">
+                          <a:solidFill>
+                            <a:srgbClr val="404040"/>
+                          </a:solidFill>
+                          <a:latin typeface="Meiryo"/>
+                        </a:rPr>
+                        <a:t>nAP</a:t>
+                      </a:r>
+                    </a:p>
+                  </a:txBody>
+                  <a:tcPr anchor="ctr">
+                    <a:solidFill>
+                      <a:srgbClr val="FFFFFF"/>
+                    </a:solidFill>
+                  </a:tcPr>
+                </a:tc>
+                <a:tc>
+                  <a:txBody>
+                    <a:bodyPr/>
+                    <a:lstStyle/>
+                    <a:p>
+                      <a:pPr algn="ctr"/>
+                      <a:r>
+                        <a:rPr sz="1200" b="0" i="0" u="none">
+                          <a:solidFill>
+                            <a:srgbClr val="404040"/>
+                          </a:solidFill>
+                          <a:latin typeface="Meiryo"/>
+                        </a:rPr>
+                        <a:t>0.1</a:t>
+                      </a:r>
+                    </a:p>
+                  </a:txBody>
+                  <a:tcPr anchor="ctr">
+                    <a:solidFill>
+                      <a:srgbClr val="FFFFFF"/>
+                    </a:solidFill>
+                  </a:tcPr>
+                </a:tc>
+                <a:tc>
+                  <a:txBody>
+                    <a:bodyPr/>
+                    <a:lstStyle/>
+                    <a:p>
+                      <a:pPr algn="ctr"/>
+                      <a:r>
+                        <a:rPr sz="1200" b="0" i="0" u="none">
+                          <a:solidFill>
+                            <a:srgbClr val="404040"/>
+                          </a:solidFill>
+                          <a:latin typeface="Meiryo"/>
+                        </a:rPr>
+                        <a:t>1.1</a:t>
+                      </a:r>
+                    </a:p>
+                  </a:txBody>
+                  <a:tcPr anchor="ctr">
+                    <a:solidFill>
+                      <a:srgbClr val="FFFFFF"/>
+                    </a:solidFill>
+                  </a:tcPr>
+                </a:tc>
+                <a:tc>
+                  <a:txBody>
+                    <a:bodyPr/>
+                    <a:lstStyle/>
+                    <a:p>
+                      <a:pPr algn="ctr"/>
+                      <a:r>
+                        <a:rPr sz="1200" b="0" i="0" u="none">
+                          <a:solidFill>
+                            <a:srgbClr val="404040"/>
+                          </a:solidFill>
+                          <a:latin typeface="Meiryo"/>
+                        </a:rPr>
+                        <a:t>0.8</a:t>
+                      </a:r>
+                    </a:p>
+                  </a:txBody>
+                  <a:tcPr anchor="ctr">
+                    <a:solidFill>
+                      <a:srgbClr val="FFFFFF"/>
+                    </a:solidFill>
+                  </a:tcPr>
+                </a:tc>
+                <a:tc>
+                  <a:txBody>
+                    <a:bodyPr/>
+                    <a:lstStyle/>
+                    <a:p>
+                      <a:pPr algn="ctr"/>
+                      <a:r>
+                        <a:rPr sz="1200" b="0" i="0" u="none">
+                          <a:solidFill>
+                            <a:srgbClr val="404040"/>
+                          </a:solidFill>
+                          <a:latin typeface="Meiryo"/>
+                        </a:rPr>
+                        <a:t>0.2</a:t>
+                      </a:r>
+                    </a:p>
+                  </a:txBody>
+                  <a:tcPr anchor="ctr">
+                    <a:solidFill>
+                      <a:srgbClr val="FFFFFF"/>
+                    </a:solidFill>
+                  </a:tcPr>
+                </a:tc>
+              </a:tr>
+              <a:tr h="194678">
+                <a:tc>
+                  <a:txBody>
+                    <a:bodyPr/>
+                    <a:lstStyle/>
+                    <a:p>
+                      <a:pPr algn="ctr"/>
+                      <a:r>
+                        <a:rPr sz="1200" b="0" i="0" u="none">
+                          <a:solidFill>
+                            <a:srgbClr val="404040"/>
+                          </a:solidFill>
+                          <a:latin typeface="Meiryo"/>
+                        </a:rPr>
+                        <a:t>nPA</a:t>
+                      </a:r>
+                    </a:p>
+                  </a:txBody>
+                  <a:tcPr anchor="ctr">
+                    <a:solidFill>
+                      <a:srgbClr val="FFFFFF"/>
+                    </a:solidFill>
+                  </a:tcPr>
+                </a:tc>
+                <a:tc>
+                  <a:txBody>
+                    <a:bodyPr/>
+                    <a:lstStyle/>
+                    <a:p>
+                      <a:pPr algn="ctr"/>
+                      <a:r>
+                        <a:rPr sz="1200" b="0" i="0" u="none">
+                          <a:solidFill>
+                            <a:srgbClr val="404040"/>
+                          </a:solidFill>
+                          <a:latin typeface="Meiryo"/>
+                        </a:rPr>
+                        <a:t>0.3</a:t>
+                      </a:r>
+                    </a:p>
+                  </a:txBody>
+                  <a:tcPr anchor="ctr">
+                    <a:solidFill>
+                      <a:srgbClr val="FFFFFF"/>
+                    </a:solidFill>
+                  </a:tcPr>
+                </a:tc>
+                <a:tc>
+                  <a:txBody>
+                    <a:bodyPr/>
+                    <a:lstStyle/>
+                    <a:p>
+                      <a:pPr algn="ctr"/>
+                      <a:r>
+                        <a:rPr sz="1200" b="0" i="0" u="none">
+                          <a:solidFill>
+                            <a:srgbClr val="404040"/>
+                          </a:solidFill>
+                          <a:latin typeface="Meiryo"/>
+                        </a:rPr>
+                        <a:t>1.9</a:t>
+                      </a:r>
+                    </a:p>
+                  </a:txBody>
+                  <a:tcPr anchor="ctr">
+                    <a:solidFill>
+                      <a:srgbClr val="FFFFFF"/>
+                    </a:solidFill>
+                  </a:tcPr>
+                </a:tc>
+                <a:tc>
+                  <a:txBody>
+                    <a:bodyPr/>
+                    <a:lstStyle/>
+                    <a:p>
+                      <a:pPr algn="ctr"/>
+                      <a:r>
+                        <a:rPr sz="1200" b="0" i="0" u="none">
+                          <a:solidFill>
+                            <a:srgbClr val="404040"/>
+                          </a:solidFill>
+                          <a:latin typeface="Meiryo"/>
+                        </a:rPr>
+                        <a:t>0.7</a:t>
+                      </a:r>
+                    </a:p>
+                  </a:txBody>
+                  <a:tcPr anchor="ctr">
+                    <a:solidFill>
+                      <a:srgbClr val="FFFFFF"/>
+                    </a:solidFill>
+                  </a:tcPr>
+                </a:tc>
+                <a:tc>
+                  <a:txBody>
+                    <a:bodyPr/>
+                    <a:lstStyle/>
+                    <a:p>
+                      <a:pPr algn="ctr"/>
+                      <a:r>
+                        <a:rPr sz="1200" b="0" i="0" u="none">
+                          <a:solidFill>
+                            <a:srgbClr val="404040"/>
+                          </a:solidFill>
+                          <a:latin typeface="Meiryo"/>
+                        </a:rPr>
+                        <a:t>0.4</a:t>
+                      </a:r>
+                    </a:p>
+                  </a:txBody>
+                  <a:tcPr anchor="ctr">
+                    <a:solidFill>
+                      <a:srgbClr val="FFFFFF"/>
+                    </a:solidFill>
+                  </a:tcPr>
+                </a:tc>
+              </a:tr>
+              <a:tr h="194678">
+                <a:tc>
+                  <a:txBody>
+                    <a:bodyPr/>
+                    <a:lstStyle/>
+                    <a:p>
+                      <a:pPr algn="ctr"/>
+                      <a:r>
+                        <a:rPr sz="1200" b="0" i="0" u="none">
+                          <a:solidFill>
+                            <a:srgbClr val="404040"/>
+                          </a:solidFill>
+                          <a:latin typeface="Meiryo"/>
+                        </a:rPr>
+                        <a:t>DA</a:t>
+                      </a:r>
+                    </a:p>
+                  </a:txBody>
+                  <a:tcPr anchor="ctr">
+                    <a:solidFill>
+                      <a:srgbClr val="FFFFFF"/>
+                    </a:solidFill>
+                  </a:tcPr>
+                </a:tc>
+                <a:tc>
+                  <a:txBody>
+                    <a:bodyPr/>
+                    <a:lstStyle/>
+                    <a:p>
+                      <a:pPr algn="ctr"/>
+                      <a:r>
+                        <a:rPr sz="1200" b="0" i="0" u="none">
+                          <a:solidFill>
+                            <a:srgbClr val="404040"/>
+                          </a:solidFill>
+                          <a:latin typeface="Meiryo"/>
+                        </a:rPr>
+                        <a:t>0</a:t>
+                      </a:r>
+                    </a:p>
+                  </a:txBody>
+                  <a:tcPr anchor="ctr">
+                    <a:solidFill>
+                      <a:srgbClr val="FFFFFF"/>
+                    </a:solidFill>
+                  </a:tcPr>
+                </a:tc>
+                <a:tc>
+                  <a:txBody>
+                    <a:bodyPr/>
+                    <a:lstStyle/>
+                    <a:p>
+                      <a:pPr algn="ctr"/>
+                      <a:r>
+                        <a:rPr sz="1200" b="0" i="0" u="none">
+                          <a:solidFill>
+                            <a:srgbClr val="404040"/>
+                          </a:solidFill>
+                          <a:latin typeface="Meiryo"/>
+                        </a:rPr>
+                        <a:t>18</a:t>
+                      </a:r>
+                    </a:p>
+                  </a:txBody>
+                  <a:tcPr anchor="ctr">
+                    <a:solidFill>
+                      <a:srgbClr val="FFFFFF"/>
+                    </a:solidFill>
+                  </a:tcPr>
+                </a:tc>
+                <a:tc>
+                  <a:txBody>
+                    <a:bodyPr/>
+                    <a:lstStyle/>
+                    <a:p>
+                      <a:pPr algn="ctr"/>
+                      <a:r>
+                        <a:rPr sz="1200" b="0" i="0" u="none">
+                          <a:solidFill>
+                            <a:srgbClr val="404040"/>
+                          </a:solidFill>
+                          <a:latin typeface="Meiryo"/>
+                        </a:rPr>
+                        <a:t>5.2</a:t>
+                      </a:r>
+                    </a:p>
+                  </a:txBody>
+                  <a:tcPr anchor="ctr">
+                    <a:solidFill>
+                      <a:srgbClr val="FFFFFF"/>
+                    </a:solidFill>
+                  </a:tcPr>
+                </a:tc>
+                <a:tc>
+                  <a:txBody>
+                    <a:bodyPr/>
+                    <a:lstStyle/>
+                    <a:p>
+                      <a:pPr algn="ctr"/>
+                      <a:r>
+                        <a:rPr sz="1200" b="0" i="0" u="none">
+                          <a:solidFill>
+                            <a:srgbClr val="404040"/>
+                          </a:solidFill>
+                          <a:latin typeface="Meiryo"/>
+                        </a:rPr>
+                        <a:t>4.0</a:t>
+                      </a:r>
+                    </a:p>
+                  </a:txBody>
+                  <a:tcPr anchor="ctr">
+                    <a:solidFill>
+                      <a:srgbClr val="FFFFFF"/>
+                    </a:solidFill>
+                  </a:tcPr>
+                </a:tc>
+              </a:tr>
+              <a:tr h="194678">
+                <a:tc>
+                  <a:txBody>
+                    <a:bodyPr/>
+                    <a:lstStyle/>
+                    <a:p>
+                      <a:pPr algn="ctr"/>
+                      <a:r>
+                        <a:rPr sz="1200" b="0" i="0" u="none">
+                          <a:solidFill>
+                            <a:srgbClr val="404040"/>
+                          </a:solidFill>
+                          <a:latin typeface="Meiryo"/>
+                        </a:rPr>
+                        <a:t>DAP</a:t>
+                      </a:r>
+                    </a:p>
+                  </a:txBody>
+                  <a:tcPr anchor="ctr">
+                    <a:solidFill>
+                      <a:srgbClr val="FFFFFF"/>
+                    </a:solidFill>
+                  </a:tcPr>
+                </a:tc>
+                <a:tc>
+                  <a:txBody>
+                    <a:bodyPr/>
+                    <a:lstStyle/>
+                    <a:p>
+                      <a:pPr algn="ctr"/>
+                      <a:r>
+                        <a:rPr sz="1200" b="0" i="0" u="none">
+                          <a:solidFill>
+                            <a:srgbClr val="404040"/>
+                          </a:solidFill>
+                          <a:latin typeface="Meiryo"/>
+                        </a:rPr>
+                        <a:t>18</a:t>
+                      </a:r>
+                    </a:p>
+                  </a:txBody>
+                  <a:tcPr anchor="ctr">
+                    <a:solidFill>
+                      <a:srgbClr val="FFFFFF"/>
+                    </a:solidFill>
+                  </a:tcPr>
+                </a:tc>
+                <a:tc>
+                  <a:txBody>
+                    <a:bodyPr/>
+                    <a:lstStyle/>
+                    <a:p>
+                      <a:pPr algn="ctr"/>
+                      <a:r>
+                        <a:rPr sz="1200" b="0" i="0" u="none">
+                          <a:solidFill>
+                            <a:srgbClr val="404040"/>
+                          </a:solidFill>
+                          <a:latin typeface="Meiryo"/>
+                        </a:rPr>
+                        <a:t>18</a:t>
+                      </a:r>
+                    </a:p>
+                  </a:txBody>
+                  <a:tcPr anchor="ctr">
+                    <a:solidFill>
+                      <a:srgbClr val="FFFFFF"/>
+                    </a:solidFill>
+                  </a:tcPr>
+                </a:tc>
+                <a:tc>
+                  <a:txBody>
+                    <a:bodyPr/>
+                    <a:lstStyle/>
+                    <a:p>
+                      <a:pPr algn="ctr"/>
+                      <a:r>
+                        <a:rPr sz="1200" b="0" i="0" u="none">
+                          <a:solidFill>
+                            <a:srgbClr val="404040"/>
+                          </a:solidFill>
+                          <a:latin typeface="Meiryo"/>
+                        </a:rPr>
+                        <a:t>18.0</a:t>
+                      </a:r>
+                    </a:p>
+                  </a:txBody>
+                  <a:tcPr anchor="ctr">
+                    <a:solidFill>
+                      <a:srgbClr val="FFFFFF"/>
+                    </a:solidFill>
+                  </a:tcPr>
+                </a:tc>
+                <a:tc>
+                  <a:txBody>
+                    <a:bodyPr/>
+                    <a:lstStyle/>
+                    <a:p>
+                      <a:pPr algn="ctr"/>
+                      <a:r>
+                        <a:rPr sz="1200" b="0" i="0" u="none">
+                          <a:solidFill>
+                            <a:srgbClr val="404040"/>
+                          </a:solidFill>
+                          <a:latin typeface="Meiryo"/>
+                        </a:rPr>
+                        <a:t>0.0</a:t>
+                      </a:r>
+                    </a:p>
+                  </a:txBody>
+                  <a:tcPr anchor="ctr">
+                    <a:solidFill>
+                      <a:srgbClr val="FFFFFF"/>
+                    </a:solidFill>
+                  </a:tcPr>
+                </a:tc>
+              </a:tr>
+              <a:tr h="194678">
+                <a:tc>
+                  <a:txBody>
+                    <a:bodyPr/>
+                    <a:lstStyle/>
+                    <a:p>
+                      <a:pPr algn="ctr"/>
+                      <a:r>
+                        <a:rPr sz="1200" b="0" i="0" u="none">
+                          <a:solidFill>
+                            <a:srgbClr val="404040"/>
+                          </a:solidFill>
+                          <a:latin typeface="Meiryo"/>
+                        </a:rPr>
+                        <a:t>DP</a:t>
+                      </a:r>
+                    </a:p>
+                  </a:txBody>
+                  <a:tcPr anchor="ctr">
+                    <a:solidFill>
+                      <a:srgbClr val="FFFFFF"/>
+                    </a:solidFill>
+                  </a:tcPr>
+                </a:tc>
+                <a:tc>
+                  <a:txBody>
+                    <a:bodyPr/>
+                    <a:lstStyle/>
+                    <a:p>
+                      <a:pPr algn="ctr"/>
+                      <a:r>
+                        <a:rPr sz="1200" b="0" i="0" u="none">
+                          <a:solidFill>
+                            <a:srgbClr val="404040"/>
+                          </a:solidFill>
+                          <a:latin typeface="Meiryo"/>
+                        </a:rPr>
+                        <a:t>0</a:t>
+                      </a:r>
+                    </a:p>
+                  </a:txBody>
+                  <a:tcPr anchor="ctr">
+                    <a:solidFill>
+                      <a:srgbClr val="FFFFFF"/>
+                    </a:solidFill>
+                  </a:tcPr>
+                </a:tc>
+                <a:tc>
+                  <a:txBody>
+                    <a:bodyPr/>
+                    <a:lstStyle/>
+                    <a:p>
+                      <a:pPr algn="ctr"/>
+                      <a:r>
+                        <a:rPr sz="1200" b="0" i="0" u="none">
+                          <a:solidFill>
+                            <a:srgbClr val="404040"/>
+                          </a:solidFill>
+                          <a:latin typeface="Meiryo"/>
+                        </a:rPr>
+                        <a:t>18</a:t>
+                      </a:r>
+                    </a:p>
+                  </a:txBody>
+                  <a:tcPr anchor="ctr">
+                    <a:solidFill>
+                      <a:srgbClr val="FFFFFF"/>
+                    </a:solidFill>
+                  </a:tcPr>
+                </a:tc>
+                <a:tc>
+                  <a:txBody>
+                    <a:bodyPr/>
+                    <a:lstStyle/>
+                    <a:p>
+                      <a:pPr algn="ctr"/>
+                      <a:r>
+                        <a:rPr sz="1200" b="0" i="0" u="none">
+                          <a:solidFill>
+                            <a:srgbClr val="404040"/>
+                          </a:solidFill>
+                          <a:latin typeface="Meiryo"/>
+                        </a:rPr>
+                        <a:t>5.8</a:t>
+                      </a:r>
+                    </a:p>
+                  </a:txBody>
+                  <a:tcPr anchor="ctr">
+                    <a:solidFill>
+                      <a:srgbClr val="FFFFFF"/>
+                    </a:solidFill>
+                  </a:tcPr>
+                </a:tc>
+                <a:tc>
+                  <a:txBody>
+                    <a:bodyPr/>
+                    <a:lstStyle/>
+                    <a:p>
+                      <a:pPr algn="ctr"/>
+                      <a:r>
+                        <a:rPr sz="1200" b="0" i="0" u="none">
+                          <a:solidFill>
+                            <a:srgbClr val="404040"/>
+                          </a:solidFill>
+                          <a:latin typeface="Meiryo"/>
+                        </a:rPr>
+                        <a:t>4.4</a:t>
+                      </a:r>
+                    </a:p>
+                  </a:txBody>
+                  <a:tcPr anchor="ctr">
+                    <a:solidFill>
+                      <a:srgbClr val="FFFFFF"/>
+                    </a:solidFill>
+                  </a:tcPr>
+                </a:tc>
+              </a:tr>
+              <a:tr h="194678">
                 <a:tc>
                   <a:txBody>
                     <a:bodyPr/>
@@ -8186,7 +9356,7 @@
                   </a:tcPr>
                 </a:tc>
               </a:tr>
-              <a:tr h="287382">
+              <a:tr h="194678">
                 <a:tc>
                   <a:txBody>
                     <a:bodyPr/>
@@ -8303,7 +9473,7 @@
                   </a:tcPr>
                 </a:tc>
               </a:tr>
-              <a:tr h="287382">
+              <a:tr h="194678">
                 <a:tc>
                   <a:txBody>
                     <a:bodyPr/>
@@ -8420,7 +9590,7 @@
                   </a:tcPr>
                 </a:tc>
               </a:tr>
-              <a:tr h="287382">
+              <a:tr h="194678">
                 <a:tc>
                   <a:txBody>
                     <a:bodyPr/>
@@ -8537,7 +9707,7 @@
                   </a:tcPr>
                 </a:tc>
               </a:tr>
-              <a:tr h="287382">
+              <a:tr h="194678">
                 <a:tc>
                   <a:txBody>
                     <a:bodyPr/>
@@ -8654,7 +9824,7 @@
                   </a:tcPr>
                 </a:tc>
               </a:tr>
-              <a:tr h="287382">
+              <a:tr h="194678">
                 <a:tc>
                   <a:txBody>
                     <a:bodyPr/>
@@ -8771,7 +9941,7 @@
                   </a:tcPr>
                 </a:tc>
               </a:tr>
-              <a:tr h="287382">
+              <a:tr h="194678">
                 <a:tc>
                   <a:txBody>
                     <a:bodyPr/>
@@ -8888,7 +10058,7 @@
                   </a:tcPr>
                 </a:tc>
               </a:tr>
-              <a:tr h="287382">
+              <a:tr h="194678">
                 <a:tc>
                   <a:txBody>
                     <a:bodyPr/>
@@ -9005,7 +10175,7 @@
                   </a:tcPr>
                 </a:tc>
               </a:tr>
-              <a:tr h="287382">
+              <a:tr h="194678">
                 <a:tc>
                   <a:txBody>
                     <a:bodyPr/>
@@ -9122,7 +10292,7 @@
                   </a:tcPr>
                 </a:tc>
               </a:tr>
-              <a:tr h="287382">
+              <a:tr h="194678">
                 <a:tc>
                   <a:txBody>
                     <a:bodyPr/>
@@ -9239,7 +10409,7 @@
                   </a:tcPr>
                 </a:tc>
               </a:tr>
-              <a:tr h="287382">
+              <a:tr h="194678">
                 <a:tc>
                   <a:txBody>
                     <a:bodyPr/>
@@ -9356,7 +10526,7 @@
                   </a:tcPr>
                 </a:tc>
               </a:tr>
-              <a:tr h="287382">
+              <a:tr h="194678">
                 <a:tc>
                   <a:txBody>
                     <a:bodyPr/>
@@ -9473,7 +10643,7 @@
                   </a:tcPr>
                 </a:tc>
               </a:tr>
-              <a:tr h="287382">
+              <a:tr h="194678">
                 <a:tc>
                   <a:txBody>
                     <a:bodyPr/>
@@ -9590,7 +10760,7 @@
                   </a:tcPr>
                 </a:tc>
               </a:tr>
-              <a:tr h="287382">
+              <a:tr h="194678">
                 <a:tc>
                   <a:txBody>
                     <a:bodyPr/>
@@ -9707,7 +10877,7 @@
                   </a:tcPr>
                 </a:tc>
               </a:tr>
-              <a:tr h="287382">
+              <a:tr h="194678">
                 <a:tc>
                   <a:txBody>
                     <a:bodyPr/>
@@ -9824,7 +10994,7 @@
                   </a:tcPr>
                 </a:tc>
               </a:tr>
-              <a:tr h="287382">
+              <a:tr h="194678">
                 <a:tc>
                   <a:txBody>
                     <a:bodyPr/>
@@ -9941,7 +11111,7 @@
                   </a:tcPr>
                 </a:tc>
               </a:tr>
-              <a:tr h="287382">
+              <a:tr h="194678">
                 <a:tc>
                   <a:txBody>
                     <a:bodyPr/>
@@ -10058,7 +11228,7 @@
                   </a:tcPr>
                 </a:tc>
               </a:tr>
-              <a:tr h="287382">
+              <a:tr h="194678">
                 <a:tc>
                   <a:txBody>
                     <a:bodyPr/>
@@ -10175,7 +11345,7 @@
                   </a:tcPr>
                 </a:tc>
               </a:tr>
-              <a:tr h="287382">
+              <a:tr h="194678">
                 <a:tc>
                   <a:txBody>
                     <a:bodyPr/>
@@ -10292,7 +11462,7 @@
                   </a:tcPr>
                 </a:tc>
               </a:tr>
-              <a:tr h="287400">
+              <a:tr h="194700">
                 <a:tc>
                   <a:txBody>
                     <a:bodyPr/>

</xml_diff>